<commit_message>
add analysis of CVE-2016-0728
</commit_message>
<xml_diff>
--- a/UAF/2016/CVE-2016-0728.pptx
+++ b/UAF/2016/CVE-2016-0728.pptx
@@ -8,8 +8,12 @@
     <p:sldId id="256" r:id="rId3"/>
     <p:sldId id="258" r:id="rId4"/>
     <p:sldId id="257" r:id="rId5"/>
-    <p:sldId id="259" r:id="rId6"/>
-    <p:sldId id="260" r:id="rId7"/>
+    <p:sldId id="264" r:id="rId6"/>
+    <p:sldId id="265" r:id="rId7"/>
+    <p:sldId id="259" r:id="rId8"/>
+    <p:sldId id="260" r:id="rId9"/>
+    <p:sldId id="263" r:id="rId10"/>
+    <p:sldId id="262" r:id="rId11"/>
   </p:sldIdLst>
   <p:sldSz cx="12192000" cy="6858000"/>
   <p:notesSz cx="7103745" cy="10234295"/>
@@ -2646,10 +2650,12 @@
           <a:bodyPr/>
           <a:p>
             <a:r>
-              <a:rPr lang="" altLang="en-US"/>
-              <a:t>CVE ID</a:t>
-            </a:r>
-            <a:endParaRPr lang="" altLang="en-US"/>
+              <a:rPr lang="en-US" altLang="zh-CN" dirty="0">
+                <a:sym typeface="+mn-ea"/>
+              </a:rPr>
+              <a:t>CVE-2016-0728</a:t>
+            </a:r>
+            <a:endParaRPr lang="en-US" altLang="en-US"/>
           </a:p>
         </p:txBody>
       </p:sp>
@@ -2704,10 +2710,10 @@
           <a:bodyPr/>
           <a:p>
             <a:r>
-              <a:rPr lang="" altLang="en-US"/>
+              <a:rPr lang="en-US" altLang="en-US"/>
               <a:t>Description</a:t>
             </a:r>
-            <a:endParaRPr lang="" altLang="en-US"/>
+            <a:endParaRPr lang="en-US" altLang="en-US"/>
           </a:p>
         </p:txBody>
       </p:sp>
@@ -2725,11 +2731,26 @@
         <p:txBody>
           <a:bodyPr/>
           <a:p>
-            <a:r>
-              <a:rPr lang="" altLang="en-US"/>
-              <a:t>feel free to extend if you think one page is not enough.</a:t>
-            </a:r>
-            <a:endParaRPr lang="" altLang="en-US"/>
+            <a:pPr marL="0" indent="0">
+              <a:buNone/>
+            </a:pPr>
+            <a:r>
+              <a:rPr lang="en-US" altLang="en-US"/>
+              <a:t>The join_session_keyring function in security/keys/process_keys.c in the Linux kernel before 4.4.1 mishandles object references in a certain error case, which allows local users to gain privileges or cause a denial of service (</a:t>
+            </a:r>
+            <a:r>
+              <a:rPr lang="en-US" altLang="en-US">
+                <a:solidFill>
+                  <a:srgbClr val="FF0000"/>
+                </a:solidFill>
+              </a:rPr>
+              <a:t>integer overflow and use-after-free</a:t>
+            </a:r>
+            <a:r>
+              <a:rPr lang="en-US" altLang="en-US"/>
+              <a:t>) via crafted keyctl commands.</a:t>
+            </a:r>
+            <a:endParaRPr lang="en-US" altLang="en-US"/>
           </a:p>
         </p:txBody>
       </p:sp>
@@ -2766,32 +2787,102 @@
           <a:bodyPr/>
           <a:p>
             <a:r>
-              <a:rPr lang="" altLang="en-US"/>
+              <a:rPr lang="en-US" altLang="en-US"/>
               <a:t>Root Cause</a:t>
             </a:r>
-            <a:endParaRPr lang="" altLang="en-US"/>
-          </a:p>
-        </p:txBody>
-      </p:sp>
-      <p:sp>
-        <p:nvSpPr>
-          <p:cNvPr id="3" name="Content Placeholder 2"/>
-          <p:cNvSpPr>
-            <a:spLocks noGrp="1"/>
-          </p:cNvSpPr>
+            <a:endParaRPr lang="en-US" altLang="en-US"/>
+          </a:p>
+        </p:txBody>
+      </p:sp>
+      <p:pic>
+        <p:nvPicPr>
+          <p:cNvPr id="4" name="Content Placeholder 3" descr="Screenshot from 2018-12-25 21-29-31"/>
+          <p:cNvPicPr>
+            <a:picLocks noChangeAspect="1"/>
+          </p:cNvPicPr>
           <p:nvPr>
             <p:ph idx="1"/>
           </p:nvPr>
-        </p:nvSpPr>
-        <p:spPr/>
-        <p:txBody>
-          <a:bodyPr/>
+        </p:nvPicPr>
+        <p:blipFill>
+          <a:blip r:embed="rId1"/>
+          <a:stretch>
+            <a:fillRect/>
+          </a:stretch>
+        </p:blipFill>
+        <p:spPr>
+          <a:xfrm>
+            <a:off x="838200" y="1691005"/>
+            <a:ext cx="5841365" cy="4351655"/>
+          </a:xfrm>
+          <a:prstGeom prst="rect">
+            <a:avLst/>
+          </a:prstGeom>
+        </p:spPr>
+      </p:pic>
+      <p:sp>
+        <p:nvSpPr>
+          <p:cNvPr id="5" name="Text Box 4"/>
+          <p:cNvSpPr txBox="1"/>
+          <p:nvPr/>
+        </p:nvSpPr>
+        <p:spPr>
+          <a:xfrm>
+            <a:off x="5770245" y="3660140"/>
+            <a:ext cx="5583555" cy="368300"/>
+          </a:xfrm>
+          <a:prstGeom prst="rect">
+            <a:avLst/>
+          </a:prstGeom>
+          <a:noFill/>
+        </p:spPr>
+        <p:txBody>
+          <a:bodyPr wrap="square" rtlCol="0">
+            <a:spAutoFit/>
+          </a:bodyPr>
           <a:p>
             <a:r>
               <a:rPr lang="en-US" altLang="en-US">
-                <a:sym typeface="+mn-ea"/>
+                <a:solidFill>
+                  <a:srgbClr val="FF0000"/>
+                </a:solidFill>
               </a:rPr>
-              <a:t>feel free to extend if you think one page is not enough.</a:t>
+              <a:t>If no name is provided, install an anonymous keyring</a:t>
+            </a:r>
+            <a:endParaRPr lang="en-US" altLang="en-US">
+              <a:solidFill>
+                <a:srgbClr val="FF0000"/>
+              </a:solidFill>
+            </a:endParaRPr>
+          </a:p>
+        </p:txBody>
+      </p:sp>
+      <p:sp>
+        <p:nvSpPr>
+          <p:cNvPr id="3" name="Text Box 2"/>
+          <p:cNvSpPr txBox="1"/>
+          <p:nvPr/>
+        </p:nvSpPr>
+        <p:spPr>
+          <a:xfrm>
+            <a:off x="1945640" y="6215380"/>
+            <a:ext cx="8300720" cy="368300"/>
+          </a:xfrm>
+          <a:prstGeom prst="rect">
+            <a:avLst/>
+          </a:prstGeom>
+          <a:noFill/>
+        </p:spPr>
+        <p:txBody>
+          <a:bodyPr wrap="square" rtlCol="0">
+            <a:spAutoFit/>
+          </a:bodyPr>
+          <a:p>
+            <a:r>
+              <a:rPr lang="en-US">
+                <a:hlinkClick r:id="rId2" tooltip="" action="ppaction://hlinkfile"/>
+              </a:rPr>
+              <a:t>https://elixir.bootlin.com/linux/v3.18/source/security/keys/process_keys.c#L753</a:t>
             </a:r>
             <a:endParaRPr lang="en-US"/>
           </a:p>
@@ -2815,6 +2906,32 @@
         <p:nvPr/>
       </p:nvGrpSpPr>
       <p:grpSpPr/>
+      <p:pic>
+        <p:nvPicPr>
+          <p:cNvPr id="6" name="Content Placeholder 5" descr="Screenshot from 2018-12-25 21-31-52"/>
+          <p:cNvPicPr>
+            <a:picLocks noChangeAspect="1"/>
+          </p:cNvPicPr>
+          <p:nvPr>
+            <p:ph idx="1"/>
+          </p:nvPr>
+        </p:nvPicPr>
+        <p:blipFill>
+          <a:blip r:embed="rId1"/>
+          <a:stretch>
+            <a:fillRect/>
+          </a:stretch>
+        </p:blipFill>
+        <p:spPr>
+          <a:xfrm>
+            <a:off x="838200" y="1320165"/>
+            <a:ext cx="5347335" cy="5537835"/>
+          </a:xfrm>
+          <a:prstGeom prst="rect">
+            <a:avLst/>
+          </a:prstGeom>
+        </p:spPr>
+      </p:pic>
       <p:sp>
         <p:nvSpPr>
           <p:cNvPr id="2" name="Title 1"/>
@@ -2830,34 +2947,259 @@
           <a:bodyPr/>
           <a:p>
             <a:r>
-              <a:rPr lang="" altLang="en-US"/>
-              <a:t>Patch</a:t>
-            </a:r>
-            <a:endParaRPr lang="" altLang="en-US"/>
-          </a:p>
-        </p:txBody>
-      </p:sp>
-      <p:sp>
-        <p:nvSpPr>
-          <p:cNvPr id="3" name="Content Placeholder 2"/>
-          <p:cNvSpPr>
-            <a:spLocks noGrp="1"/>
-          </p:cNvSpPr>
-          <p:nvPr>
-            <p:ph idx="1"/>
-          </p:nvPr>
-        </p:nvSpPr>
-        <p:spPr/>
-        <p:txBody>
-          <a:bodyPr/>
+              <a:rPr lang="en-US" altLang="en-US"/>
+              <a:t>Root Cause</a:t>
+            </a:r>
+            <a:endParaRPr lang="en-US" altLang="en-US"/>
+          </a:p>
+        </p:txBody>
+      </p:sp>
+      <p:sp>
+        <p:nvSpPr>
+          <p:cNvPr id="7" name="Text Box 6"/>
+          <p:cNvSpPr txBox="1"/>
+          <p:nvPr/>
+        </p:nvSpPr>
+        <p:spPr>
+          <a:xfrm>
+            <a:off x="4568825" y="1224280"/>
+            <a:ext cx="5317490" cy="368300"/>
+          </a:xfrm>
+          <a:prstGeom prst="rect">
+            <a:avLst/>
+          </a:prstGeom>
+          <a:noFill/>
+        </p:spPr>
+        <p:txBody>
+          <a:bodyPr wrap="square" rtlCol="0">
+            <a:spAutoFit/>
+          </a:bodyPr>
           <a:p>
             <a:r>
               <a:rPr lang="en-US" altLang="en-US">
-                <a:sym typeface="+mn-ea"/>
+                <a:solidFill>
+                  <a:srgbClr val="FF0000"/>
+                </a:solidFill>
               </a:rPr>
-              <a:t>feel free to extend if you think one page is not enough.</a:t>
-            </a:r>
-            <a:endParaRPr lang="en-US"/>
+              <a:t>find an existing keyring according to variable name </a:t>
+            </a:r>
+            <a:endParaRPr lang="en-US" altLang="en-US">
+              <a:solidFill>
+                <a:srgbClr val="FF0000"/>
+              </a:solidFill>
+            </a:endParaRPr>
+          </a:p>
+        </p:txBody>
+      </p:sp>
+      <p:sp>
+        <p:nvSpPr>
+          <p:cNvPr id="8" name="Text Box 7"/>
+          <p:cNvSpPr txBox="1"/>
+          <p:nvPr/>
+        </p:nvSpPr>
+        <p:spPr>
+          <a:xfrm>
+            <a:off x="4768850" y="1765300"/>
+            <a:ext cx="5812155" cy="368300"/>
+          </a:xfrm>
+          <a:prstGeom prst="rect">
+            <a:avLst/>
+          </a:prstGeom>
+          <a:noFill/>
+        </p:spPr>
+        <p:txBody>
+          <a:bodyPr wrap="square" rtlCol="0">
+            <a:spAutoFit/>
+          </a:bodyPr>
+          <a:p>
+            <a:r>
+              <a:rPr lang="en-US" altLang="en-US">
+                <a:solidFill>
+                  <a:srgbClr val="FF0000"/>
+                </a:solidFill>
+              </a:rPr>
+              <a:t>If there is no such a keyring, just create a new one</a:t>
+            </a:r>
+            <a:endParaRPr lang="en-US" altLang="en-US">
+              <a:solidFill>
+                <a:srgbClr val="FF0000"/>
+              </a:solidFill>
+            </a:endParaRPr>
+          </a:p>
+        </p:txBody>
+      </p:sp>
+      <p:sp>
+        <p:nvSpPr>
+          <p:cNvPr id="9" name="Text Box 8"/>
+          <p:cNvSpPr txBox="1"/>
+          <p:nvPr/>
+        </p:nvSpPr>
+        <p:spPr>
+          <a:xfrm>
+            <a:off x="3756660" y="2989580"/>
+            <a:ext cx="5513705" cy="368300"/>
+          </a:xfrm>
+          <a:prstGeom prst="rect">
+            <a:avLst/>
+          </a:prstGeom>
+          <a:noFill/>
+        </p:spPr>
+        <p:txBody>
+          <a:bodyPr wrap="square" rtlCol="0">
+            <a:spAutoFit/>
+          </a:bodyPr>
+          <a:p>
+            <a:r>
+              <a:rPr lang="en-US" altLang="en-US">
+                <a:solidFill>
+                  <a:srgbClr val="FF0000"/>
+                </a:solidFill>
+              </a:rPr>
+              <a:t>If the return value is an abnormal errno, just return it.</a:t>
+            </a:r>
+            <a:endParaRPr lang="en-US" altLang="en-US">
+              <a:solidFill>
+                <a:srgbClr val="FF0000"/>
+              </a:solidFill>
+            </a:endParaRPr>
+          </a:p>
+        </p:txBody>
+      </p:sp>
+      <p:sp>
+        <p:nvSpPr>
+          <p:cNvPr id="10" name="Text Box 9"/>
+          <p:cNvSpPr txBox="1"/>
+          <p:nvPr/>
+        </p:nvSpPr>
+        <p:spPr>
+          <a:xfrm>
+            <a:off x="4768850" y="3357880"/>
+            <a:ext cx="6585585" cy="1753235"/>
+          </a:xfrm>
+          <a:prstGeom prst="rect">
+            <a:avLst/>
+          </a:prstGeom>
+          <a:noFill/>
+        </p:spPr>
+        <p:txBody>
+          <a:bodyPr wrap="square" rtlCol="0">
+            <a:spAutoFit/>
+          </a:bodyPr>
+          <a:p>
+            <a:r>
+              <a:rPr lang="en-US" altLang="en-US"/>
+              <a:t>In the previous slide, variable new is created by prepare_creds. From its implementation, variable new is a copy of task struct. If the found keyring is equal to own session keying, don't need to update any more. </a:t>
+            </a:r>
+            <a:r>
+              <a:rPr lang="en-US" altLang="en-US">
+                <a:solidFill>
+                  <a:srgbClr val="FF0000"/>
+                </a:solidFill>
+              </a:rPr>
+              <a:t>Then it goto error2, and bug occurs.</a:t>
+            </a:r>
+            <a:endParaRPr lang="en-US" altLang="en-US">
+              <a:solidFill>
+                <a:srgbClr val="FF0000"/>
+              </a:solidFill>
+            </a:endParaRPr>
+          </a:p>
+          <a:p>
+            <a:r>
+              <a:rPr lang="en-US" altLang="en-US">
+                <a:solidFill>
+                  <a:srgbClr val="FF0000"/>
+                </a:solidFill>
+              </a:rPr>
+              <a:t>As find_keyring_by_name increases the reference count of keying, we need to decrease it before exit.</a:t>
+            </a:r>
+            <a:endParaRPr lang="en-US" altLang="en-US">
+              <a:solidFill>
+                <a:srgbClr val="FF0000"/>
+              </a:solidFill>
+            </a:endParaRPr>
+          </a:p>
+        </p:txBody>
+      </p:sp>
+      <p:sp>
+        <p:nvSpPr>
+          <p:cNvPr id="11" name="Rounded Rectangle 10"/>
+          <p:cNvSpPr/>
+          <p:nvPr/>
+        </p:nvSpPr>
+        <p:spPr>
+          <a:xfrm>
+            <a:off x="1701800" y="5394960"/>
+            <a:ext cx="1529080" cy="165100"/>
+          </a:xfrm>
+          <a:prstGeom prst="roundRect">
+            <a:avLst/>
+          </a:prstGeom>
+          <a:noFill/>
+          <a:ln>
+            <a:solidFill>
+              <a:srgbClr val="FF0000"/>
+            </a:solidFill>
+          </a:ln>
+        </p:spPr>
+        <p:style>
+          <a:lnRef idx="2">
+            <a:schemeClr val="accent1">
+              <a:shade val="50000"/>
+            </a:schemeClr>
+          </a:lnRef>
+          <a:fillRef idx="1">
+            <a:schemeClr val="accent1"/>
+          </a:fillRef>
+          <a:effectRef idx="0">
+            <a:schemeClr val="accent1"/>
+          </a:effectRef>
+          <a:fontRef idx="minor">
+            <a:schemeClr val="lt1"/>
+          </a:fontRef>
+        </p:style>
+        <p:txBody>
+          <a:bodyPr rtlCol="0" anchor="ctr"/>
+          <a:p>
+            <a:pPr algn="ctr"/>
+            <a:endParaRPr lang="en-US"/>
+          </a:p>
+        </p:txBody>
+      </p:sp>
+      <p:sp>
+        <p:nvSpPr>
+          <p:cNvPr id="12" name="Text Box 11"/>
+          <p:cNvSpPr txBox="1"/>
+          <p:nvPr/>
+        </p:nvSpPr>
+        <p:spPr>
+          <a:xfrm>
+            <a:off x="3364865" y="5394960"/>
+            <a:ext cx="4396740" cy="368300"/>
+          </a:xfrm>
+          <a:prstGeom prst="rect">
+            <a:avLst/>
+          </a:prstGeom>
+          <a:noFill/>
+        </p:spPr>
+        <p:txBody>
+          <a:bodyPr wrap="square" rtlCol="0">
+            <a:spAutoFit/>
+          </a:bodyPr>
+          <a:p>
+            <a:r>
+              <a:rPr lang="en-US" altLang="en-US">
+                <a:solidFill>
+                  <a:srgbClr val="FF0000"/>
+                </a:solidFill>
+              </a:rPr>
+              <a:t>Decrease the reference count of keyring</a:t>
+            </a:r>
+            <a:endParaRPr lang="en-US" altLang="en-US">
+              <a:solidFill>
+                <a:srgbClr val="FF0000"/>
+              </a:solidFill>
+            </a:endParaRPr>
           </a:p>
         </p:txBody>
       </p:sp>
@@ -2891,36 +3233,543 @@
         </p:nvSpPr>
         <p:spPr/>
         <p:txBody>
-          <a:bodyPr/>
-          <a:p>
-            <a:r>
-              <a:rPr lang="" altLang="en-US"/>
-              <a:t>Patch Analysis</a:t>
-            </a:r>
-            <a:endParaRPr lang="" altLang="en-US"/>
-          </a:p>
-        </p:txBody>
-      </p:sp>
-      <p:sp>
-        <p:nvSpPr>
-          <p:cNvPr id="3" name="Content Placeholder 2"/>
-          <p:cNvSpPr>
-            <a:spLocks noGrp="1"/>
-          </p:cNvSpPr>
-          <p:nvPr>
-            <p:ph idx="1"/>
-          </p:nvPr>
-        </p:nvSpPr>
-        <p:spPr/>
-        <p:txBody>
-          <a:bodyPr/>
+          <a:bodyPr>
+            <a:normAutofit/>
+          </a:bodyPr>
           <a:p>
             <a:r>
               <a:rPr lang="en-US" altLang="en-US">
                 <a:sym typeface="+mn-ea"/>
               </a:rPr>
-              <a:t>feel free to extend if you think one page is not enough.</a:t>
-            </a:r>
+              <a:t>Root Cause</a:t>
+            </a:r>
+            <a:endParaRPr lang="en-US"/>
+          </a:p>
+        </p:txBody>
+      </p:sp>
+      <p:pic>
+        <p:nvPicPr>
+          <p:cNvPr id="4" name="Content Placeholder 3" descr="Screenshot from 2018-12-25 21-54-16"/>
+          <p:cNvPicPr>
+            <a:picLocks noChangeAspect="1"/>
+          </p:cNvPicPr>
+          <p:nvPr>
+            <p:ph idx="1"/>
+          </p:nvPr>
+        </p:nvPicPr>
+        <p:blipFill>
+          <a:blip r:embed="rId1"/>
+          <a:stretch>
+            <a:fillRect/>
+          </a:stretch>
+        </p:blipFill>
+        <p:spPr>
+          <a:xfrm>
+            <a:off x="838200" y="1344930"/>
+            <a:ext cx="5695950" cy="3124200"/>
+          </a:xfrm>
+          <a:prstGeom prst="rect">
+            <a:avLst/>
+          </a:prstGeom>
+        </p:spPr>
+      </p:pic>
+      <p:pic>
+        <p:nvPicPr>
+          <p:cNvPr id="5" name="Picture 4" descr="Screenshot from 2018-12-25 21-55-12"/>
+          <p:cNvPicPr>
+            <a:picLocks noChangeAspect="1"/>
+          </p:cNvPicPr>
+          <p:nvPr/>
+        </p:nvPicPr>
+        <p:blipFill>
+          <a:blip r:embed="rId2"/>
+          <a:stretch>
+            <a:fillRect/>
+          </a:stretch>
+        </p:blipFill>
+        <p:spPr>
+          <a:xfrm>
+            <a:off x="6621145" y="-5715"/>
+            <a:ext cx="5607685" cy="6863715"/>
+          </a:xfrm>
+          <a:prstGeom prst="rect">
+            <a:avLst/>
+          </a:prstGeom>
+        </p:spPr>
+      </p:pic>
+      <p:sp>
+        <p:nvSpPr>
+          <p:cNvPr id="6" name="Rounded Rectangle 5"/>
+          <p:cNvSpPr/>
+          <p:nvPr/>
+        </p:nvSpPr>
+        <p:spPr>
+          <a:xfrm>
+            <a:off x="2383790" y="3582670"/>
+            <a:ext cx="2890520" cy="454025"/>
+          </a:xfrm>
+          <a:prstGeom prst="roundRect">
+            <a:avLst/>
+          </a:prstGeom>
+          <a:noFill/>
+          <a:ln>
+            <a:solidFill>
+              <a:srgbClr val="FF0000"/>
+            </a:solidFill>
+          </a:ln>
+        </p:spPr>
+        <p:style>
+          <a:lnRef idx="2">
+            <a:schemeClr val="accent1">
+              <a:shade val="50000"/>
+            </a:schemeClr>
+          </a:lnRef>
+          <a:fillRef idx="1">
+            <a:schemeClr val="accent1"/>
+          </a:fillRef>
+          <a:effectRef idx="0">
+            <a:schemeClr val="accent1"/>
+          </a:effectRef>
+          <a:fontRef idx="minor">
+            <a:schemeClr val="lt1"/>
+          </a:fontRef>
+        </p:style>
+        <p:txBody>
+          <a:bodyPr rtlCol="0" anchor="ctr"/>
+          <a:p>
+            <a:pPr algn="ctr"/>
+            <a:endParaRPr lang="en-US"/>
+          </a:p>
+        </p:txBody>
+      </p:sp>
+      <p:sp>
+        <p:nvSpPr>
+          <p:cNvPr id="7" name="Rounded Rectangle 6"/>
+          <p:cNvSpPr/>
+          <p:nvPr/>
+        </p:nvSpPr>
+        <p:spPr>
+          <a:xfrm>
+            <a:off x="8463280" y="4669790"/>
+            <a:ext cx="3302635" cy="763270"/>
+          </a:xfrm>
+          <a:prstGeom prst="roundRect">
+            <a:avLst/>
+          </a:prstGeom>
+          <a:noFill/>
+          <a:ln>
+            <a:solidFill>
+              <a:srgbClr val="FF0000"/>
+            </a:solidFill>
+          </a:ln>
+        </p:spPr>
+        <p:style>
+          <a:lnRef idx="2">
+            <a:schemeClr val="accent1">
+              <a:shade val="50000"/>
+            </a:schemeClr>
+          </a:lnRef>
+          <a:fillRef idx="1">
+            <a:schemeClr val="accent1"/>
+          </a:fillRef>
+          <a:effectRef idx="0">
+            <a:schemeClr val="accent1"/>
+          </a:effectRef>
+          <a:fontRef idx="minor">
+            <a:schemeClr val="lt1"/>
+          </a:fontRef>
+        </p:style>
+        <p:txBody>
+          <a:bodyPr rtlCol="0" anchor="ctr"/>
+          <a:p>
+            <a:pPr algn="ctr"/>
+            <a:endParaRPr lang="en-US"/>
+          </a:p>
+        </p:txBody>
+      </p:sp>
+      <p:sp>
+        <p:nvSpPr>
+          <p:cNvPr id="8" name="Text Box 7"/>
+          <p:cNvSpPr txBox="1"/>
+          <p:nvPr/>
+        </p:nvSpPr>
+        <p:spPr>
+          <a:xfrm>
+            <a:off x="3582035" y="3214370"/>
+            <a:ext cx="2952115" cy="368300"/>
+          </a:xfrm>
+          <a:prstGeom prst="rect">
+            <a:avLst/>
+          </a:prstGeom>
+          <a:noFill/>
+        </p:spPr>
+        <p:txBody>
+          <a:bodyPr wrap="square" rtlCol="0">
+            <a:spAutoFit/>
+          </a:bodyPr>
+          <a:p>
+            <a:r>
+              <a:rPr lang="en-US" altLang="en-US">
+                <a:solidFill>
+                  <a:srgbClr val="FF0000"/>
+                </a:solidFill>
+              </a:rPr>
+              <a:t>decrease reference count</a:t>
+            </a:r>
+            <a:endParaRPr lang="en-US" altLang="en-US">
+              <a:solidFill>
+                <a:srgbClr val="FF0000"/>
+              </a:solidFill>
+            </a:endParaRPr>
+          </a:p>
+        </p:txBody>
+      </p:sp>
+      <p:sp>
+        <p:nvSpPr>
+          <p:cNvPr id="9" name="Text Box 8"/>
+          <p:cNvSpPr txBox="1"/>
+          <p:nvPr/>
+        </p:nvSpPr>
+        <p:spPr>
+          <a:xfrm>
+            <a:off x="9262110" y="5602605"/>
+            <a:ext cx="2952115" cy="368300"/>
+          </a:xfrm>
+          <a:prstGeom prst="rect">
+            <a:avLst/>
+          </a:prstGeom>
+          <a:noFill/>
+        </p:spPr>
+        <p:txBody>
+          <a:bodyPr wrap="square" rtlCol="0">
+            <a:spAutoFit/>
+          </a:bodyPr>
+          <a:p>
+            <a:r>
+              <a:rPr lang="en-US" altLang="en-US">
+                <a:solidFill>
+                  <a:srgbClr val="FF0000"/>
+                </a:solidFill>
+              </a:rPr>
+              <a:t>increase reference count</a:t>
+            </a:r>
+            <a:endParaRPr lang="en-US" altLang="en-US">
+              <a:solidFill>
+                <a:srgbClr val="FF0000"/>
+              </a:solidFill>
+            </a:endParaRPr>
+          </a:p>
+        </p:txBody>
+      </p:sp>
+    </p:spTree>
+  </p:cSld>
+  <p:clrMapOvr>
+    <a:masterClrMapping/>
+  </p:clrMapOvr>
+</p:sld>
+</file>
+
+<file path=ppt/slides/slide6.xml><?xml version="1.0" encoding="utf-8"?>
+<p:sld xmlns:a="http://schemas.openxmlformats.org/drawingml/2006/main" xmlns:r="http://schemas.openxmlformats.org/officeDocument/2006/relationships" xmlns:p="http://schemas.openxmlformats.org/presentationml/2006/main">
+  <p:cSld>
+    <p:spTree>
+      <p:nvGrpSpPr>
+        <p:cNvPr id="1" name=""/>
+        <p:cNvGrpSpPr/>
+        <p:nvPr/>
+      </p:nvGrpSpPr>
+      <p:grpSpPr/>
+      <p:sp>
+        <p:nvSpPr>
+          <p:cNvPr id="2" name="Title 1"/>
+          <p:cNvSpPr>
+            <a:spLocks noGrp="1"/>
+          </p:cNvSpPr>
+          <p:nvPr>
+            <p:ph type="title"/>
+          </p:nvPr>
+        </p:nvSpPr>
+        <p:spPr/>
+        <p:txBody>
+          <a:bodyPr/>
+          <a:p>
+            <a:r>
+              <a:rPr lang="en-US" altLang="en-US"/>
+              <a:t>Patch</a:t>
+            </a:r>
+            <a:endParaRPr lang="en-US" altLang="en-US"/>
+          </a:p>
+        </p:txBody>
+      </p:sp>
+      <p:sp>
+        <p:nvSpPr>
+          <p:cNvPr id="5" name="Text Box 4"/>
+          <p:cNvSpPr txBox="1"/>
+          <p:nvPr/>
+        </p:nvSpPr>
+        <p:spPr>
+          <a:xfrm>
+            <a:off x="838200" y="5807075"/>
+            <a:ext cx="10515600" cy="368300"/>
+          </a:xfrm>
+          <a:prstGeom prst="rect">
+            <a:avLst/>
+          </a:prstGeom>
+          <a:noFill/>
+        </p:spPr>
+        <p:txBody>
+          <a:bodyPr wrap="square" rtlCol="0">
+            <a:spAutoFit/>
+          </a:bodyPr>
+          <a:p>
+            <a:r>
+              <a:rPr lang="en-US">
+                <a:hlinkClick r:id="rId1" action="ppaction://hlinkfile"/>
+              </a:rPr>
+              <a:t>https://github.com/torvalds/linux/commit/23567fd052a9abb6d67fe8e7a9ccdd9800a540f2?diff=unified</a:t>
+            </a:r>
+            <a:endParaRPr lang="en-US"/>
+          </a:p>
+        </p:txBody>
+      </p:sp>
+      <p:pic>
+        <p:nvPicPr>
+          <p:cNvPr id="7" name="Content Placeholder 6" descr="Screenshot from 2018-12-25 22-06-36"/>
+          <p:cNvPicPr>
+            <a:picLocks noChangeAspect="1"/>
+          </p:cNvPicPr>
+          <p:nvPr>
+            <p:ph idx="1"/>
+          </p:nvPr>
+        </p:nvPicPr>
+        <p:blipFill>
+          <a:blip r:embed="rId2"/>
+          <a:stretch>
+            <a:fillRect/>
+          </a:stretch>
+        </p:blipFill>
+        <p:spPr>
+          <a:xfrm>
+            <a:off x="1423670" y="1800225"/>
+            <a:ext cx="9344025" cy="2419350"/>
+          </a:xfrm>
+          <a:prstGeom prst="rect">
+            <a:avLst/>
+          </a:prstGeom>
+        </p:spPr>
+      </p:pic>
+    </p:spTree>
+  </p:cSld>
+  <p:clrMapOvr>
+    <a:masterClrMapping/>
+  </p:clrMapOvr>
+</p:sld>
+</file>
+
+<file path=ppt/slides/slide7.xml><?xml version="1.0" encoding="utf-8"?>
+<p:sld xmlns:a="http://schemas.openxmlformats.org/drawingml/2006/main" xmlns:r="http://schemas.openxmlformats.org/officeDocument/2006/relationships" xmlns:p="http://schemas.openxmlformats.org/presentationml/2006/main">
+  <p:cSld>
+    <p:spTree>
+      <p:nvGrpSpPr>
+        <p:cNvPr id="1" name=""/>
+        <p:cNvGrpSpPr/>
+        <p:nvPr/>
+      </p:nvGrpSpPr>
+      <p:grpSpPr/>
+      <p:sp>
+        <p:nvSpPr>
+          <p:cNvPr id="2" name="Title 1"/>
+          <p:cNvSpPr>
+            <a:spLocks noGrp="1"/>
+          </p:cNvSpPr>
+          <p:nvPr>
+            <p:ph type="title"/>
+          </p:nvPr>
+        </p:nvSpPr>
+        <p:spPr/>
+        <p:txBody>
+          <a:bodyPr/>
+          <a:p>
+            <a:r>
+              <a:rPr lang="en-US" altLang="en-US"/>
+              <a:t>Patch Analysis</a:t>
+            </a:r>
+            <a:endParaRPr lang="en-US" altLang="en-US"/>
+          </a:p>
+        </p:txBody>
+      </p:sp>
+      <p:sp>
+        <p:nvSpPr>
+          <p:cNvPr id="3" name="Content Placeholder 2"/>
+          <p:cNvSpPr>
+            <a:spLocks noGrp="1"/>
+          </p:cNvSpPr>
+          <p:nvPr>
+            <p:ph idx="1"/>
+          </p:nvPr>
+        </p:nvSpPr>
+        <p:spPr/>
+        <p:txBody>
+          <a:bodyPr/>
+          <a:p>
+            <a:r>
+              <a:rPr lang="en-US" altLang="en-US"/>
+              <a:t>The patch adds one line directly to decrease the reference count before goto error2.</a:t>
+            </a:r>
+            <a:endParaRPr lang="en-US" altLang="en-US"/>
+          </a:p>
+        </p:txBody>
+      </p:sp>
+    </p:spTree>
+  </p:cSld>
+  <p:clrMapOvr>
+    <a:masterClrMapping/>
+  </p:clrMapOvr>
+</p:sld>
+</file>
+
+<file path=ppt/slides/slide8.xml><?xml version="1.0" encoding="utf-8"?>
+<p:sld xmlns:a="http://schemas.openxmlformats.org/drawingml/2006/main" xmlns:r="http://schemas.openxmlformats.org/officeDocument/2006/relationships" xmlns:p="http://schemas.openxmlformats.org/presentationml/2006/main">
+  <p:cSld>
+    <p:spTree>
+      <p:nvGrpSpPr>
+        <p:cNvPr id="1" name=""/>
+        <p:cNvGrpSpPr/>
+        <p:nvPr/>
+      </p:nvGrpSpPr>
+      <p:grpSpPr/>
+      <p:sp>
+        <p:nvSpPr>
+          <p:cNvPr id="2" name="Title 1"/>
+          <p:cNvSpPr>
+            <a:spLocks noGrp="1"/>
+          </p:cNvSpPr>
+          <p:nvPr>
+            <p:ph type="title"/>
+          </p:nvPr>
+        </p:nvSpPr>
+        <p:spPr/>
+        <p:txBody>
+          <a:bodyPr/>
+          <a:p>
+            <a:r>
+              <a:rPr lang="en-US" altLang="en-US"/>
+              <a:t>PoC / Exploits</a:t>
+            </a:r>
+            <a:endParaRPr lang="en-US" altLang="en-US"/>
+          </a:p>
+        </p:txBody>
+      </p:sp>
+      <p:sp>
+        <p:nvSpPr>
+          <p:cNvPr id="3" name="Content Placeholder 2"/>
+          <p:cNvSpPr>
+            <a:spLocks noGrp="1"/>
+          </p:cNvSpPr>
+          <p:nvPr>
+            <p:ph idx="1"/>
+          </p:nvPr>
+        </p:nvSpPr>
+        <p:spPr/>
+        <p:txBody>
+          <a:bodyPr/>
+          <a:p>
+            <a:r>
+              <a:rPr lang="en-US">
+                <a:hlinkClick r:id="rId1" action="ppaction://hlinkfile"/>
+              </a:rPr>
+              <a:t>https://perception-point.io/resources/case-studies/analysis-and-exploitation-of-a-linux-kernel-vulnerability/</a:t>
+            </a:r>
+            <a:endParaRPr lang="en-US"/>
+          </a:p>
+          <a:p>
+            <a:r>
+              <a:rPr lang="en-US">
+                <a:hlinkClick r:id="rId2" action="ppaction://hlinkfile"/>
+              </a:rPr>
+              <a:t>https://www.exploit-db.com/exploits/39277/</a:t>
+            </a:r>
+            <a:endParaRPr lang="en-US"/>
+          </a:p>
+          <a:p>
+            <a:endParaRPr lang="en-US"/>
+          </a:p>
+        </p:txBody>
+      </p:sp>
+    </p:spTree>
+  </p:cSld>
+  <p:clrMapOvr>
+    <a:masterClrMapping/>
+  </p:clrMapOvr>
+</p:sld>
+</file>
+
+<file path=ppt/slides/slide9.xml><?xml version="1.0" encoding="utf-8"?>
+<p:sld xmlns:a="http://schemas.openxmlformats.org/drawingml/2006/main" xmlns:r="http://schemas.openxmlformats.org/officeDocument/2006/relationships" xmlns:p="http://schemas.openxmlformats.org/presentationml/2006/main">
+  <p:cSld>
+    <p:spTree>
+      <p:nvGrpSpPr>
+        <p:cNvPr id="1" name=""/>
+        <p:cNvGrpSpPr/>
+        <p:nvPr/>
+      </p:nvGrpSpPr>
+      <p:grpSpPr/>
+      <p:sp>
+        <p:nvSpPr>
+          <p:cNvPr id="2" name="Title 1"/>
+          <p:cNvSpPr>
+            <a:spLocks noGrp="1"/>
+          </p:cNvSpPr>
+          <p:nvPr>
+            <p:ph type="title"/>
+          </p:nvPr>
+        </p:nvSpPr>
+        <p:spPr/>
+        <p:txBody>
+          <a:bodyPr/>
+          <a:p>
+            <a:r>
+              <a:rPr lang="en-US" altLang="en-US"/>
+              <a:t>References</a:t>
+            </a:r>
+            <a:endParaRPr lang="en-US" altLang="en-US"/>
+          </a:p>
+        </p:txBody>
+      </p:sp>
+      <p:sp>
+        <p:nvSpPr>
+          <p:cNvPr id="3" name="Content Placeholder 2"/>
+          <p:cNvSpPr>
+            <a:spLocks noGrp="1"/>
+          </p:cNvSpPr>
+          <p:nvPr>
+            <p:ph idx="1"/>
+          </p:nvPr>
+        </p:nvSpPr>
+        <p:spPr/>
+        <p:txBody>
+          <a:bodyPr/>
+          <a:p>
+            <a:r>
+              <a:rPr lang="en-US">
+                <a:hlinkClick r:id="rId1" action="ppaction://hlinkfile"/>
+              </a:rPr>
+              <a:t>https://perception-point.io/resources/case-studies/analysis-and-exploitation-of-a-linux-kernel-vulnerability/</a:t>
+            </a:r>
+            <a:endParaRPr lang="en-US">
+              <a:hlinkClick r:id="rId1" action="ppaction://hlinkfile"/>
+            </a:endParaRPr>
+          </a:p>
+          <a:p>
+            <a:r>
+              <a:rPr lang="en-US">
+                <a:hlinkClick r:id="rId2" action="ppaction://hlinkfile"/>
+              </a:rPr>
+              <a:t>https://www.kernel.org/doc/Documentation/security/credentials.txt</a:t>
+            </a:r>
+            <a:endParaRPr lang="en-US"/>
+          </a:p>
+          <a:p>
             <a:endParaRPr lang="en-US"/>
           </a:p>
         </p:txBody>

</xml_diff>

<commit_message>
add another vulnerability analysis
</commit_message>
<xml_diff>
--- a/UAF/2016/CVE-2016-0728.pptx
+++ b/UAF/2016/CVE-2016-0728.pptx
@@ -2880,7 +2880,7 @@
           <a:p>
             <a:r>
               <a:rPr lang="en-US">
-                <a:hlinkClick r:id="rId2" tooltip="" action="ppaction://hlinkfile"/>
+                <a:hlinkClick r:id="rId2" action="ppaction://hlinkfile"/>
               </a:rPr>
               <a:t>https://elixir.bootlin.com/linux/v3.18/source/security/keys/process_keys.c#L753</a:t>
             </a:r>
@@ -3752,18 +3752,27 @@
           <a:p>
             <a:r>
               <a:rPr lang="en-US">
-                <a:hlinkClick r:id="rId1" action="ppaction://hlinkfile"/>
+                <a:hlinkClick r:id="rId1" tooltip="" action="ppaction://hlinkfile"/>
+              </a:rPr>
+              <a:t>https://nvd.nist.gov/vuln/detail/CVE-2016-0728</a:t>
+            </a:r>
+            <a:endParaRPr lang="en-US"/>
+          </a:p>
+          <a:p>
+            <a:r>
+              <a:rPr lang="en-US">
+                <a:hlinkClick r:id="rId2" action="ppaction://hlinkfile"/>
               </a:rPr>
               <a:t>https://perception-point.io/resources/case-studies/analysis-and-exploitation-of-a-linux-kernel-vulnerability/</a:t>
             </a:r>
             <a:endParaRPr lang="en-US">
-              <a:hlinkClick r:id="rId1" action="ppaction://hlinkfile"/>
+              <a:hlinkClick r:id="rId2" action="ppaction://hlinkfile"/>
             </a:endParaRPr>
           </a:p>
           <a:p>
             <a:r>
               <a:rPr lang="en-US">
-                <a:hlinkClick r:id="rId2" action="ppaction://hlinkfile"/>
+                <a:hlinkClick r:id="rId3" action="ppaction://hlinkfile"/>
               </a:rPr>
               <a:t>https://www.kernel.org/doc/Documentation/security/credentials.txt</a:t>
             </a:r>

</xml_diff>